<commit_message>
Presentacion casi definitiva añadir codigo
Joel añade el codigo que te parezca que hay que presentar
</commit_message>
<xml_diff>
--- a/PHONEDUINO.pptx
+++ b/PHONEDUINO.pptx
@@ -6,17 +6,17 @@
   </p:sldMasterIdLst>
   <p:sldIdLst>
     <p:sldId id="256" r:id="rId2"/>
-    <p:sldId id="257" r:id="rId3"/>
-    <p:sldId id="266" r:id="rId4"/>
-    <p:sldId id="267" r:id="rId5"/>
-    <p:sldId id="268" r:id="rId6"/>
-    <p:sldId id="269" r:id="rId7"/>
-    <p:sldId id="258" r:id="rId8"/>
-    <p:sldId id="259" r:id="rId9"/>
-    <p:sldId id="261" r:id="rId10"/>
-    <p:sldId id="262" r:id="rId11"/>
-    <p:sldId id="260" r:id="rId12"/>
-    <p:sldId id="263" r:id="rId13"/>
+    <p:sldId id="267" r:id="rId3"/>
+    <p:sldId id="268" r:id="rId4"/>
+    <p:sldId id="269" r:id="rId5"/>
+    <p:sldId id="270" r:id="rId6"/>
+    <p:sldId id="271" r:id="rId7"/>
+    <p:sldId id="260" r:id="rId8"/>
+    <p:sldId id="258" r:id="rId9"/>
+    <p:sldId id="259" r:id="rId10"/>
+    <p:sldId id="261" r:id="rId11"/>
+    <p:sldId id="263" r:id="rId12"/>
+    <p:sldId id="262" r:id="rId13"/>
     <p:sldId id="264" r:id="rId14"/>
     <p:sldId id="265" r:id="rId15"/>
   </p:sldIdLst>
@@ -231,7 +231,7 @@
           <a:p>
             <a:fld id="{D9764EC8-4C1D-41D0-8D64-98E6E2873507}" type="datetimeFigureOut">
               <a:rPr lang="es-ES" smtClean="0"/>
-              <a:t>21/04/2017</a:t>
+              <a:t>23/04/2017</a:t>
             </a:fld>
             <a:endParaRPr lang="es-ES"/>
           </a:p>
@@ -457,7 +457,7 @@
           <a:p>
             <a:fld id="{D9764EC8-4C1D-41D0-8D64-98E6E2873507}" type="datetimeFigureOut">
               <a:rPr lang="es-ES" smtClean="0"/>
-              <a:t>21/04/2017</a:t>
+              <a:t>23/04/2017</a:t>
             </a:fld>
             <a:endParaRPr lang="es-ES"/>
           </a:p>
@@ -632,7 +632,7 @@
           <a:p>
             <a:fld id="{D9764EC8-4C1D-41D0-8D64-98E6E2873507}" type="datetimeFigureOut">
               <a:rPr lang="es-ES" smtClean="0"/>
-              <a:t>21/04/2017</a:t>
+              <a:t>23/04/2017</a:t>
             </a:fld>
             <a:endParaRPr lang="es-ES"/>
           </a:p>
@@ -797,7 +797,7 @@
           <a:p>
             <a:fld id="{D9764EC8-4C1D-41D0-8D64-98E6E2873507}" type="datetimeFigureOut">
               <a:rPr lang="es-ES" smtClean="0"/>
-              <a:t>21/04/2017</a:t>
+              <a:t>23/04/2017</a:t>
             </a:fld>
             <a:endParaRPr lang="es-ES"/>
           </a:p>
@@ -1041,7 +1041,7 @@
           <a:p>
             <a:fld id="{D9764EC8-4C1D-41D0-8D64-98E6E2873507}" type="datetimeFigureOut">
               <a:rPr lang="es-ES" smtClean="0"/>
-              <a:t>21/04/2017</a:t>
+              <a:t>23/04/2017</a:t>
             </a:fld>
             <a:endParaRPr lang="es-ES"/>
           </a:p>
@@ -1305,7 +1305,7 @@
           <a:p>
             <a:fld id="{D9764EC8-4C1D-41D0-8D64-98E6E2873507}" type="datetimeFigureOut">
               <a:rPr lang="es-ES" smtClean="0"/>
-              <a:t>21/04/2017</a:t>
+              <a:t>23/04/2017</a:t>
             </a:fld>
             <a:endParaRPr lang="es-ES"/>
           </a:p>
@@ -1679,7 +1679,7 @@
           <a:p>
             <a:fld id="{D9764EC8-4C1D-41D0-8D64-98E6E2873507}" type="datetimeFigureOut">
               <a:rPr lang="es-ES" smtClean="0"/>
-              <a:t>21/04/2017</a:t>
+              <a:t>23/04/2017</a:t>
             </a:fld>
             <a:endParaRPr lang="es-ES"/>
           </a:p>
@@ -1792,7 +1792,7 @@
           <a:p>
             <a:fld id="{D9764EC8-4C1D-41D0-8D64-98E6E2873507}" type="datetimeFigureOut">
               <a:rPr lang="es-ES" smtClean="0"/>
-              <a:t>21/04/2017</a:t>
+              <a:t>23/04/2017</a:t>
             </a:fld>
             <a:endParaRPr lang="es-ES"/>
           </a:p>
@@ -1882,7 +1882,7 @@
           <a:p>
             <a:fld id="{D9764EC8-4C1D-41D0-8D64-98E6E2873507}" type="datetimeFigureOut">
               <a:rPr lang="es-ES" smtClean="0"/>
-              <a:t>21/04/2017</a:t>
+              <a:t>23/04/2017</a:t>
             </a:fld>
             <a:endParaRPr lang="es-ES"/>
           </a:p>
@@ -2140,7 +2140,7 @@
           <a:p>
             <a:fld id="{D9764EC8-4C1D-41D0-8D64-98E6E2873507}" type="datetimeFigureOut">
               <a:rPr lang="es-ES" smtClean="0"/>
-              <a:t>21/04/2017</a:t>
+              <a:t>23/04/2017</a:t>
             </a:fld>
             <a:endParaRPr lang="es-ES"/>
           </a:p>
@@ -2404,7 +2404,7 @@
           <a:p>
             <a:fld id="{D9764EC8-4C1D-41D0-8D64-98E6E2873507}" type="datetimeFigureOut">
               <a:rPr lang="es-ES" smtClean="0"/>
-              <a:t>21/04/2017</a:t>
+              <a:t>23/04/2017</a:t>
             </a:fld>
             <a:endParaRPr lang="es-ES"/>
           </a:p>
@@ -2621,7 +2621,7 @@
           <a:p>
             <a:fld id="{D9764EC8-4C1D-41D0-8D64-98E6E2873507}" type="datetimeFigureOut">
               <a:rPr lang="es-ES" smtClean="0"/>
-              <a:t>21/04/2017</a:t>
+              <a:t>23/04/2017</a:t>
             </a:fld>
             <a:endParaRPr lang="es-ES"/>
           </a:p>
@@ -3076,14 +3076,14 @@
             <a:r>
               <a:rPr lang="es-ES" sz="5600" b="1" u="sng" dirty="0" smtClean="0">
                 <a:solidFill>
-                  <a:srgbClr val="FF0000"/>
+                  <a:schemeClr val="accent1"/>
                 </a:solidFill>
               </a:rPr>
               <a:t>PHONEDUINO</a:t>
             </a:r>
             <a:endParaRPr lang="es-ES" sz="5600" b="1" u="sng" dirty="0">
               <a:solidFill>
-                <a:srgbClr val="FF0000"/>
+                <a:schemeClr val="accent1"/>
               </a:solidFill>
             </a:endParaRPr>
           </a:p>
@@ -3221,67 +3221,75 @@
           <a:p>
             <a:r>
               <a:rPr lang="es-ES" dirty="0" smtClean="0"/>
-              <a:t>Problemas</a:t>
+              <a:t>Pruebas con la FONA</a:t>
             </a:r>
             <a:endParaRPr lang="es-ES" dirty="0"/>
           </a:p>
         </p:txBody>
       </p:sp>
-      <p:sp>
-        <p:nvSpPr>
-          <p:cNvPr id="3" name="2 Marcador de contenido"/>
-          <p:cNvSpPr>
-            <a:spLocks noGrp="1"/>
-          </p:cNvSpPr>
+      <p:pic>
+        <p:nvPicPr>
+          <p:cNvPr id="4" name="3 Marcador de contenido"/>
+          <p:cNvPicPr>
+            <a:picLocks noGrp="1" noChangeAspect="1"/>
+          </p:cNvPicPr>
           <p:nvPr>
             <p:ph idx="1"/>
           </p:nvPr>
-        </p:nvSpPr>
-        <p:spPr/>
-        <p:txBody>
-          <a:bodyPr/>
-          <a:lstStyle/>
-          <a:p>
-            <a:r>
-              <a:rPr lang="es-ES" dirty="0" smtClean="0"/>
-              <a:t>Diferentes problemas de montaje a la hora de soldar y conectar los pines.</a:t>
-            </a:r>
-          </a:p>
-          <a:p>
-            <a:r>
-              <a:rPr lang="es-ES" dirty="0" smtClean="0"/>
-              <a:t>Con el sistema operativo (Windows 10).</a:t>
-            </a:r>
-          </a:p>
-          <a:p>
-            <a:r>
-              <a:rPr lang="es-ES" dirty="0" smtClean="0"/>
-              <a:t>Encontrar como usar la batería. </a:t>
-            </a:r>
-          </a:p>
-          <a:p>
-            <a:r>
-              <a:rPr lang="es-ES" dirty="0" smtClean="0"/>
-              <a:t>Poca memoria de la placa de </a:t>
-            </a:r>
-            <a:r>
-              <a:rPr lang="es-ES" dirty="0" err="1" smtClean="0"/>
-              <a:t>arduino</a:t>
-            </a:r>
-            <a:r>
-              <a:rPr lang="es-ES" dirty="0" smtClean="0"/>
-              <a:t>.</a:t>
-            </a:r>
-          </a:p>
-          <a:p>
-            <a:endParaRPr lang="es-ES" dirty="0"/>
-          </a:p>
-        </p:txBody>
-      </p:sp>
+        </p:nvPicPr>
+        <p:blipFill>
+          <a:blip r:embed="rId2" cstate="print">
+            <a:extLst>
+              <a:ext uri="{28A0092B-C50C-407E-A947-70E740481C1C}">
+                <a14:useLocalDpi xmlns:a14="http://schemas.microsoft.com/office/drawing/2010/main" val="0"/>
+              </a:ext>
+            </a:extLst>
+          </a:blip>
+          <a:stretch>
+            <a:fillRect/>
+          </a:stretch>
+        </p:blipFill>
+        <p:spPr>
+          <a:xfrm>
+            <a:off x="1259632" y="1409018"/>
+            <a:ext cx="2915060" cy="4972310"/>
+          </a:xfrm>
+        </p:spPr>
+      </p:pic>
+      <p:pic>
+        <p:nvPicPr>
+          <p:cNvPr id="5" name="4 Imagen"/>
+          <p:cNvPicPr>
+            <a:picLocks noChangeAspect="1"/>
+          </p:cNvPicPr>
+          <p:nvPr/>
+        </p:nvPicPr>
+        <p:blipFill>
+          <a:blip r:embed="rId3" cstate="print">
+            <a:extLst>
+              <a:ext uri="{28A0092B-C50C-407E-A947-70E740481C1C}">
+                <a14:useLocalDpi xmlns:a14="http://schemas.microsoft.com/office/drawing/2010/main" val="0"/>
+              </a:ext>
+            </a:extLst>
+          </a:blip>
+          <a:stretch>
+            <a:fillRect/>
+          </a:stretch>
+        </p:blipFill>
+        <p:spPr>
+          <a:xfrm>
+            <a:off x="4860032" y="1412776"/>
+            <a:ext cx="2912017" cy="4968552"/>
+          </a:xfrm>
+          <a:prstGeom prst="rect">
+            <a:avLst/>
+          </a:prstGeom>
+        </p:spPr>
+      </p:pic>
     </p:spTree>
     <p:extLst>
       <p:ext uri="{BB962C8B-B14F-4D97-AF65-F5344CB8AC3E}">
-        <p14:creationId xmlns:p14="http://schemas.microsoft.com/office/powerpoint/2010/main" val="1167390517"/>
+        <p14:creationId xmlns:p14="http://schemas.microsoft.com/office/powerpoint/2010/main" val="537628809"/>
       </p:ext>
     </p:extLst>
   </p:cSld>
@@ -3332,45 +3340,35 @@
           <a:p>
             <a:r>
               <a:rPr lang="es-ES" dirty="0" smtClean="0"/>
-              <a:t>Esquema hardware</a:t>
+              <a:t>Análisis del código</a:t>
             </a:r>
             <a:endParaRPr lang="es-ES" dirty="0"/>
           </a:p>
         </p:txBody>
       </p:sp>
-      <p:pic>
-        <p:nvPicPr>
-          <p:cNvPr id="5" name="4 Marcador de contenido"/>
-          <p:cNvPicPr>
-            <a:picLocks noGrp="1" noChangeAspect="1"/>
-          </p:cNvPicPr>
+      <p:sp>
+        <p:nvSpPr>
+          <p:cNvPr id="3" name="2 Marcador de contenido"/>
+          <p:cNvSpPr>
+            <a:spLocks noGrp="1"/>
+          </p:cNvSpPr>
           <p:nvPr>
             <p:ph idx="1"/>
           </p:nvPr>
-        </p:nvPicPr>
-        <p:blipFill>
-          <a:blip r:embed="rId2" cstate="print">
-            <a:extLst>
-              <a:ext uri="{28A0092B-C50C-407E-A947-70E740481C1C}">
-                <a14:useLocalDpi xmlns:a14="http://schemas.microsoft.com/office/drawing/2010/main" val="0"/>
-              </a:ext>
-            </a:extLst>
-          </a:blip>
-          <a:stretch>
-            <a:fillRect/>
-          </a:stretch>
-        </p:blipFill>
-        <p:spPr>
-          <a:xfrm>
-            <a:off x="1187625" y="1600200"/>
-            <a:ext cx="6360114" cy="4708525"/>
-          </a:xfrm>
-        </p:spPr>
-      </p:pic>
+        </p:nvSpPr>
+        <p:spPr/>
+        <p:txBody>
+          <a:bodyPr/>
+          <a:lstStyle/>
+          <a:p>
+            <a:endParaRPr lang="es-ES" dirty="0"/>
+          </a:p>
+        </p:txBody>
+      </p:sp>
     </p:spTree>
     <p:extLst>
       <p:ext uri="{BB962C8B-B14F-4D97-AF65-F5344CB8AC3E}">
-        <p14:creationId xmlns:p14="http://schemas.microsoft.com/office/powerpoint/2010/main" val="3017095161"/>
+        <p14:creationId xmlns:p14="http://schemas.microsoft.com/office/powerpoint/2010/main" val="313665115"/>
       </p:ext>
     </p:extLst>
   </p:cSld>
@@ -3421,7 +3419,7 @@
           <a:p>
             <a:r>
               <a:rPr lang="es-ES" dirty="0" smtClean="0"/>
-              <a:t>Análisis del código</a:t>
+              <a:t>Problemas</a:t>
             </a:r>
             <a:endParaRPr lang="es-ES" dirty="0"/>
           </a:p>
@@ -3442,6 +3440,36 @@
           <a:bodyPr/>
           <a:lstStyle/>
           <a:p>
+            <a:r>
+              <a:rPr lang="es-ES" dirty="0" smtClean="0"/>
+              <a:t>Diferentes problemas de montaje a la hora de soldar y conectar los pines.</a:t>
+            </a:r>
+          </a:p>
+          <a:p>
+            <a:r>
+              <a:rPr lang="es-ES" dirty="0" smtClean="0"/>
+              <a:t>Con el sistema operativo (Windows 10).</a:t>
+            </a:r>
+          </a:p>
+          <a:p>
+            <a:r>
+              <a:rPr lang="es-ES" dirty="0" smtClean="0"/>
+              <a:t>Encontrar como usar el </a:t>
+            </a:r>
+            <a:r>
+              <a:rPr lang="es-ES" dirty="0" err="1" smtClean="0"/>
+              <a:t>Phoneduino</a:t>
+            </a:r>
+            <a:r>
+              <a:rPr lang="es-ES" dirty="0" smtClean="0"/>
+              <a:t> con la batería. </a:t>
+            </a:r>
+          </a:p>
+          <a:p>
+            <a:r>
+              <a:rPr lang="es-ES" dirty="0" smtClean="0"/>
+              <a:t>Con el altavoz, cables muy finos.</a:t>
+            </a:r>
             <a:endParaRPr lang="es-ES" dirty="0"/>
           </a:p>
         </p:txBody>
@@ -3449,7 +3477,7 @@
     </p:spTree>
     <p:extLst>
       <p:ext uri="{BB962C8B-B14F-4D97-AF65-F5344CB8AC3E}">
-        <p14:creationId xmlns:p14="http://schemas.microsoft.com/office/powerpoint/2010/main" val="313665115"/>
+        <p14:creationId xmlns:p14="http://schemas.microsoft.com/office/powerpoint/2010/main" val="1167390517"/>
       </p:ext>
     </p:extLst>
   </p:cSld>
@@ -3493,7 +3521,12 @@
             <p:ph type="title"/>
           </p:nvPr>
         </p:nvSpPr>
-        <p:spPr/>
+        <p:spPr>
+          <a:xfrm>
+            <a:off x="467544" y="260648"/>
+            <a:ext cx="8229600" cy="1143000"/>
+          </a:xfrm>
+        </p:spPr>
         <p:txBody>
           <a:bodyPr/>
           <a:lstStyle/>
@@ -3516,7 +3549,12 @@
             <p:ph idx="1"/>
           </p:nvPr>
         </p:nvSpPr>
-        <p:spPr/>
+        <p:spPr>
+          <a:xfrm>
+            <a:off x="467544" y="1844824"/>
+            <a:ext cx="8229600" cy="4709160"/>
+          </a:xfrm>
+        </p:spPr>
         <p:txBody>
           <a:bodyPr/>
           <a:lstStyle/>
@@ -3529,6 +3567,12 @@
           <a:p>
             <a:r>
               <a:rPr lang="es-ES" dirty="0" smtClean="0"/>
+              <a:t>Añadir funcionalidad de radio, de mensajería (SMS), GPS… etc.</a:t>
+            </a:r>
+          </a:p>
+          <a:p>
+            <a:r>
+              <a:rPr lang="es-ES" dirty="0" smtClean="0"/>
               <a:t>Inclusión de funciones externas (juegos, reproductor mp3, </a:t>
             </a:r>
             <a:r>
@@ -3537,7 +3581,7 @@
             </a:r>
             <a:r>
               <a:rPr lang="es-ES" dirty="0" smtClean="0"/>
-              <a:t>).</a:t>
+              <a:t>)</a:t>
             </a:r>
           </a:p>
           <a:p>
@@ -3557,32 +3601,11 @@
           <a:p>
             <a:r>
               <a:rPr lang="es-ES" dirty="0" smtClean="0"/>
-              <a:t>Uso del dispositivo de almacenamiento secundario con un tarjeta SD.</a:t>
-            </a:r>
-          </a:p>
-          <a:p>
-            <a:r>
-              <a:rPr lang="es-ES" dirty="0" smtClean="0"/>
-              <a:t>Tamaño, carcasa.</a:t>
-            </a:r>
-          </a:p>
-          <a:p>
-            <a:r>
-              <a:rPr lang="es-ES" dirty="0" err="1" smtClean="0"/>
-              <a:t>Etc</a:t>
-            </a:r>
-            <a:r>
-              <a:rPr lang="es-ES" dirty="0" smtClean="0"/>
-              <a:t>, </a:t>
-            </a:r>
-            <a:r>
-              <a:rPr lang="es-ES" dirty="0" err="1" smtClean="0"/>
-              <a:t>etc</a:t>
-            </a:r>
-            <a:r>
-              <a:rPr lang="es-ES" dirty="0" smtClean="0"/>
-              <a:t>, etc…</a:t>
-            </a:r>
+              <a:t>Mejorar el tamaño del terminal.</a:t>
+            </a:r>
+          </a:p>
+          <a:p>
+            <a:endParaRPr lang="es-ES" dirty="0" smtClean="0"/>
           </a:p>
           <a:p>
             <a:endParaRPr lang="es-ES" dirty="0"/>
@@ -3740,7 +3763,7 @@
             <p:ph idx="1"/>
             <p:extLst>
               <p:ext uri="{D42A27DB-BD31-4B8C-83A1-F6EECF244321}">
-                <p14:modId xmlns:p14="http://schemas.microsoft.com/office/powerpoint/2010/main" val="2016602619"/>
+                <p14:modId xmlns:p14="http://schemas.microsoft.com/office/powerpoint/2010/main" val="850216775"/>
               </p:ext>
             </p:extLst>
           </p:nvPr>
@@ -3945,12 +3968,42 @@
                     <a:lstStyle/>
                     <a:p>
                       <a:r>
-                        <a:rPr lang="es-ES" sz="1100">
-                          <a:effectLst/>
-                        </a:rPr>
-                        <a:t>Adafruit FONA 800 uFL Shield Starter Pack</a:t>
-                      </a:r>
-                      <a:endParaRPr lang="es-ES" sz="1100" b="1">
+                        <a:rPr lang="es-ES" sz="1100" dirty="0" smtClean="0">
+                          <a:effectLst/>
+                        </a:rPr>
+                        <a:t>FONA </a:t>
+                      </a:r>
+                      <a:r>
+                        <a:rPr lang="es-ES" sz="1100" dirty="0">
+                          <a:effectLst/>
+                        </a:rPr>
+                        <a:t>800 </a:t>
+                      </a:r>
+                      <a:r>
+                        <a:rPr lang="es-ES" sz="1100" dirty="0" err="1">
+                          <a:effectLst/>
+                        </a:rPr>
+                        <a:t>uFL</a:t>
+                      </a:r>
+                      <a:r>
+                        <a:rPr lang="es-ES" sz="1100" dirty="0">
+                          <a:effectLst/>
+                        </a:rPr>
+                        <a:t> </a:t>
+                      </a:r>
+                      <a:r>
+                        <a:rPr lang="es-ES" sz="1100" dirty="0" err="1">
+                          <a:effectLst/>
+                        </a:rPr>
+                        <a:t>Shield</a:t>
+                      </a:r>
+                      <a:r>
+                        <a:rPr lang="es-ES" sz="1100" dirty="0">
+                          <a:effectLst/>
+                        </a:rPr>
+                        <a:t> Starter Pack</a:t>
+                      </a:r>
+                      <a:endParaRPr lang="es-ES" sz="1100" b="1" dirty="0">
                         <a:effectLst/>
                         <a:latin typeface="Calibri"/>
                         <a:ea typeface="Times New Roman"/>
@@ -4034,12 +4087,72 @@
                         </a:spcAft>
                       </a:pPr>
                       <a:r>
-                        <a:rPr lang="es-ES" sz="1100" kern="1800">
-                          <a:effectLst/>
-                        </a:rPr>
-                        <a:t>Adafruit FONA 800 Shield – Voice/Data Cellular GSM for Arduino</a:t>
-                      </a:r>
-                      <a:endParaRPr lang="es-ES" sz="1100">
+                        <a:rPr lang="es-ES" sz="1100" kern="1800" dirty="0" smtClean="0">
+                          <a:effectLst/>
+                        </a:rPr>
+                        <a:t>FONA </a:t>
+                      </a:r>
+                      <a:r>
+                        <a:rPr lang="es-ES" sz="1100" kern="1800" dirty="0">
+                          <a:effectLst/>
+                        </a:rPr>
+                        <a:t>800 </a:t>
+                      </a:r>
+                      <a:r>
+                        <a:rPr lang="es-ES" sz="1100" kern="1800" dirty="0" err="1">
+                          <a:effectLst/>
+                        </a:rPr>
+                        <a:t>Shield</a:t>
+                      </a:r>
+                      <a:r>
+                        <a:rPr lang="es-ES" sz="1100" kern="1800" dirty="0">
+                          <a:effectLst/>
+                        </a:rPr>
+                        <a:t> – </a:t>
+                      </a:r>
+                      <a:r>
+                        <a:rPr lang="es-ES" sz="1100" kern="1800" dirty="0" err="1">
+                          <a:effectLst/>
+                        </a:rPr>
+                        <a:t>Voice</a:t>
+                      </a:r>
+                      <a:r>
+                        <a:rPr lang="es-ES" sz="1100" kern="1800" dirty="0">
+                          <a:effectLst/>
+                        </a:rPr>
+                        <a:t>/Data </a:t>
+                      </a:r>
+                      <a:r>
+                        <a:rPr lang="es-ES" sz="1100" kern="1800" dirty="0" err="1">
+                          <a:effectLst/>
+                        </a:rPr>
+                        <a:t>Cellular</a:t>
+                      </a:r>
+                      <a:r>
+                        <a:rPr lang="es-ES" sz="1100" kern="1800" dirty="0">
+                          <a:effectLst/>
+                        </a:rPr>
+                        <a:t> GSM </a:t>
+                      </a:r>
+                      <a:r>
+                        <a:rPr lang="es-ES" sz="1100" kern="1800" dirty="0" err="1">
+                          <a:effectLst/>
+                        </a:rPr>
+                        <a:t>for</a:t>
+                      </a:r>
+                      <a:r>
+                        <a:rPr lang="es-ES" sz="1100" kern="1800" dirty="0">
+                          <a:effectLst/>
+                        </a:rPr>
+                        <a:t> </a:t>
+                      </a:r>
+                      <a:r>
+                        <a:rPr lang="es-ES" sz="1100" kern="1800" dirty="0" err="1">
+                          <a:effectLst/>
+                        </a:rPr>
+                        <a:t>Arduino</a:t>
+                      </a:r>
+                      <a:endParaRPr lang="es-ES" sz="1100" dirty="0">
                         <a:effectLst/>
                         <a:latin typeface="Calibri"/>
                         <a:ea typeface="Calibri"/>
@@ -4083,7 +4196,7 @@
                     <a:bodyPr/>
                     <a:lstStyle/>
                     <a:p>
-                      <a:pPr algn="ctr">
+                      <a:pPr algn="l">
                         <a:lnSpc>
                           <a:spcPct val="115000"/>
                         </a:lnSpc>
@@ -4095,19 +4208,19 @@
                         <a:rPr lang="es-ES" sz="1100" dirty="0">
                           <a:effectLst/>
                         </a:rPr>
-                        <a:t>Incluido en </a:t>
-                      </a:r>
-                      <a:r>
-                        <a:rPr lang="es-ES" sz="1100" dirty="0" err="1">
-                          <a:effectLst/>
-                        </a:rPr>
-                        <a:t>Adafruit</a:t>
+                        <a:t>Incluido </a:t>
+                      </a:r>
+                      <a:r>
+                        <a:rPr lang="es-ES" sz="1100" dirty="0" smtClean="0">
+                          <a:effectLst/>
+                        </a:rPr>
+                        <a:t>en FONA </a:t>
                       </a:r>
                       <a:r>
                         <a:rPr lang="es-ES" sz="1100" dirty="0">
                           <a:effectLst/>
                         </a:rPr>
-                        <a:t> FONA 800 </a:t>
+                        <a:t>800 </a:t>
                       </a:r>
                       <a:r>
                         <a:rPr lang="es-ES" sz="1100" dirty="0" err="1">
@@ -4212,19 +4325,19 @@
                         <a:rPr lang="es-ES" sz="1100" dirty="0">
                           <a:effectLst/>
                         </a:rPr>
-                        <a:t>Incluido en </a:t>
-                      </a:r>
-                      <a:r>
-                        <a:rPr lang="es-ES" sz="1100" dirty="0" err="1">
-                          <a:effectLst/>
-                        </a:rPr>
-                        <a:t>Adafruit</a:t>
+                        <a:t>Incluido </a:t>
+                      </a:r>
+                      <a:r>
+                        <a:rPr lang="es-ES" sz="1100" dirty="0" smtClean="0">
+                          <a:effectLst/>
+                        </a:rPr>
+                        <a:t>en FONA </a:t>
                       </a:r>
                       <a:r>
                         <a:rPr lang="es-ES" sz="1100" dirty="0">
                           <a:effectLst/>
                         </a:rPr>
-                        <a:t> FONA 800 </a:t>
+                        <a:t>800 </a:t>
                       </a:r>
                       <a:r>
                         <a:rPr lang="es-ES" sz="1100" dirty="0" err="1">
@@ -4326,12 +4439,48 @@
                         </a:spcAft>
                       </a:pPr>
                       <a:r>
-                        <a:rPr lang="es-ES" sz="1100">
-                          <a:effectLst/>
-                        </a:rPr>
-                        <a:t>Incluido en Adafruit FONA 800 uFL Shield Starter Pack</a:t>
-                      </a:r>
-                      <a:endParaRPr lang="es-ES" sz="1100">
+                        <a:rPr lang="es-ES" sz="1100" dirty="0">
+                          <a:effectLst/>
+                        </a:rPr>
+                        <a:t>Incluido </a:t>
+                      </a:r>
+                      <a:r>
+                        <a:rPr lang="es-ES" sz="1100" dirty="0" smtClean="0">
+                          <a:effectLst/>
+                        </a:rPr>
+                        <a:t>en </a:t>
+                      </a:r>
+                      <a:r>
+                        <a:rPr lang="es-ES" sz="1100" dirty="0">
+                          <a:effectLst/>
+                        </a:rPr>
+                        <a:t>FONA 800 </a:t>
+                      </a:r>
+                      <a:r>
+                        <a:rPr lang="es-ES" sz="1100" dirty="0" err="1">
+                          <a:effectLst/>
+                        </a:rPr>
+                        <a:t>uFL</a:t>
+                      </a:r>
+                      <a:r>
+                        <a:rPr lang="es-ES" sz="1100" dirty="0">
+                          <a:effectLst/>
+                        </a:rPr>
+                        <a:t> </a:t>
+                      </a:r>
+                      <a:r>
+                        <a:rPr lang="es-ES" sz="1100" dirty="0" err="1">
+                          <a:effectLst/>
+                        </a:rPr>
+                        <a:t>Shield</a:t>
+                      </a:r>
+                      <a:r>
+                        <a:rPr lang="es-ES" sz="1100" dirty="0">
+                          <a:effectLst/>
+                        </a:rPr>
+                        <a:t> Starter Pack</a:t>
+                      </a:r>
+                      <a:endParaRPr lang="es-ES" sz="1100" dirty="0">
                         <a:effectLst/>
                         <a:latin typeface="Calibri"/>
                         <a:ea typeface="Calibri"/>
@@ -4407,12 +4556,48 @@
                         </a:spcAft>
                       </a:pPr>
                       <a:r>
-                        <a:rPr lang="es-ES" sz="1100">
-                          <a:effectLst/>
-                        </a:rPr>
-                        <a:t>Incluido en Adafruit FONA 800 uFL Shield Starter Pack</a:t>
-                      </a:r>
-                      <a:endParaRPr lang="es-ES" sz="1100">
+                        <a:rPr lang="es-ES" sz="1100" dirty="0">
+                          <a:effectLst/>
+                        </a:rPr>
+                        <a:t>Incluido </a:t>
+                      </a:r>
+                      <a:r>
+                        <a:rPr lang="es-ES" sz="1100" dirty="0" smtClean="0">
+                          <a:effectLst/>
+                        </a:rPr>
+                        <a:t>en FONA </a:t>
+                      </a:r>
+                      <a:r>
+                        <a:rPr lang="es-ES" sz="1100" dirty="0">
+                          <a:effectLst/>
+                        </a:rPr>
+                        <a:t>800 </a:t>
+                      </a:r>
+                      <a:r>
+                        <a:rPr lang="es-ES" sz="1100" dirty="0" err="1">
+                          <a:effectLst/>
+                        </a:rPr>
+                        <a:t>uFL</a:t>
+                      </a:r>
+                      <a:r>
+                        <a:rPr lang="es-ES" sz="1100" dirty="0">
+                          <a:effectLst/>
+                        </a:rPr>
+                        <a:t> </a:t>
+                      </a:r>
+                      <a:r>
+                        <a:rPr lang="es-ES" sz="1100" dirty="0" err="1">
+                          <a:effectLst/>
+                        </a:rPr>
+                        <a:t>Shield</a:t>
+                      </a:r>
+                      <a:r>
+                        <a:rPr lang="es-ES" sz="1100" dirty="0">
+                          <a:effectLst/>
+                        </a:rPr>
+                        <a:t> Starter Pack</a:t>
+                      </a:r>
+                      <a:endParaRPr lang="es-ES" sz="1100" dirty="0">
                         <a:effectLst/>
                         <a:latin typeface="Calibri"/>
                         <a:ea typeface="Calibri"/>
@@ -4488,12 +4673,48 @@
                         </a:spcAft>
                       </a:pPr>
                       <a:r>
-                        <a:rPr lang="es-ES" sz="1100">
-                          <a:effectLst/>
-                        </a:rPr>
-                        <a:t>Incluido en Adafruit FONA 800 uFL Shield Starter Pack</a:t>
-                      </a:r>
-                      <a:endParaRPr lang="es-ES" sz="1100">
+                        <a:rPr lang="es-ES" sz="1100" dirty="0">
+                          <a:effectLst/>
+                        </a:rPr>
+                        <a:t>Incluido </a:t>
+                      </a:r>
+                      <a:r>
+                        <a:rPr lang="es-ES" sz="1100" dirty="0" smtClean="0">
+                          <a:effectLst/>
+                        </a:rPr>
+                        <a:t>en </a:t>
+                      </a:r>
+                      <a:r>
+                        <a:rPr lang="es-ES" sz="1100" dirty="0">
+                          <a:effectLst/>
+                        </a:rPr>
+                        <a:t>FONA 800 </a:t>
+                      </a:r>
+                      <a:r>
+                        <a:rPr lang="es-ES" sz="1100" dirty="0" err="1">
+                          <a:effectLst/>
+                        </a:rPr>
+                        <a:t>uFL</a:t>
+                      </a:r>
+                      <a:r>
+                        <a:rPr lang="es-ES" sz="1100" dirty="0">
+                          <a:effectLst/>
+                        </a:rPr>
+                        <a:t> </a:t>
+                      </a:r>
+                      <a:r>
+                        <a:rPr lang="es-ES" sz="1100" dirty="0" err="1">
+                          <a:effectLst/>
+                        </a:rPr>
+                        <a:t>Shield</a:t>
+                      </a:r>
+                      <a:r>
+                        <a:rPr lang="es-ES" sz="1100" dirty="0">
+                          <a:effectLst/>
+                        </a:rPr>
+                        <a:t> Starter Pack</a:t>
+                      </a:r>
+                      <a:endParaRPr lang="es-ES" sz="1100" dirty="0">
                         <a:effectLst/>
                         <a:latin typeface="Calibri"/>
                         <a:ea typeface="Calibri"/>
@@ -4572,19 +4793,19 @@
                         <a:rPr lang="es-ES" sz="1100" dirty="0">
                           <a:effectLst/>
                         </a:rPr>
-                        <a:t>Incluido en </a:t>
-                      </a:r>
-                      <a:r>
-                        <a:rPr lang="es-ES" sz="1100" dirty="0" err="1">
-                          <a:effectLst/>
-                        </a:rPr>
-                        <a:t>Adafruit</a:t>
+                        <a:t>Incluido </a:t>
+                      </a:r>
+                      <a:r>
+                        <a:rPr lang="es-ES" sz="1100" dirty="0" smtClean="0">
+                          <a:effectLst/>
+                        </a:rPr>
+                        <a:t>en </a:t>
                       </a:r>
                       <a:r>
                         <a:rPr lang="es-ES" sz="1100" dirty="0">
                           <a:effectLst/>
                         </a:rPr>
-                        <a:t> FONA 800 </a:t>
+                        <a:t>FONA 800 </a:t>
                       </a:r>
                       <a:r>
                         <a:rPr lang="es-ES" sz="1100" dirty="0" err="1">
@@ -4628,7 +4849,7 @@
     </p:spTree>
     <p:extLst>
       <p:ext uri="{BB962C8B-B14F-4D97-AF65-F5344CB8AC3E}">
-        <p14:creationId xmlns:p14="http://schemas.microsoft.com/office/powerpoint/2010/main" val="308792325"/>
+        <p14:creationId xmlns:p14="http://schemas.microsoft.com/office/powerpoint/2010/main" val="2497218948"/>
       </p:ext>
     </p:extLst>
   </p:cSld>
@@ -4700,7 +4921,7 @@
             <p:ph idx="1"/>
             <p:extLst>
               <p:ext uri="{D42A27DB-BD31-4B8C-83A1-F6EECF244321}">
-                <p14:modId xmlns:p14="http://schemas.microsoft.com/office/powerpoint/2010/main" val="2566978602"/>
+                <p14:modId xmlns:p14="http://schemas.microsoft.com/office/powerpoint/2010/main" val="408820568"/>
               </p:ext>
             </p:extLst>
           </p:nvPr>
@@ -4810,13 +5031,13 @@
                         <a:t>Incluido en </a:t>
                       </a:r>
                       <a:r>
-                        <a:rPr lang="es-ES" sz="1100" dirty="0" err="1">
+                        <a:rPr lang="es-ES" sz="1100" dirty="0" smtClean="0">
                           <a:solidFill>
                             <a:schemeClr val="bg1"/>
                           </a:solidFill>
                           <a:effectLst/>
                         </a:rPr>
-                        <a:t>Adafruit</a:t>
+                        <a:t>FONA </a:t>
                       </a:r>
                       <a:r>
                         <a:rPr lang="es-ES" sz="1100" dirty="0">
@@ -4825,7 +5046,7 @@
                           </a:solidFill>
                           <a:effectLst/>
                         </a:rPr>
-                        <a:t> FONA 800 </a:t>
+                        <a:t>800 </a:t>
                       </a:r>
                       <a:r>
                         <a:rPr lang="es-ES" sz="1100" dirty="0" err="1">
@@ -5505,7 +5726,7 @@
     </p:spTree>
     <p:extLst>
       <p:ext uri="{BB962C8B-B14F-4D97-AF65-F5344CB8AC3E}">
-        <p14:creationId xmlns:p14="http://schemas.microsoft.com/office/powerpoint/2010/main" val="1413913942"/>
+        <p14:creationId xmlns:p14="http://schemas.microsoft.com/office/powerpoint/2010/main" val="318275620"/>
       </p:ext>
     </p:extLst>
   </p:cSld>
@@ -5624,7 +5845,7 @@
     </p:spTree>
     <p:extLst>
       <p:ext uri="{BB962C8B-B14F-4D97-AF65-F5344CB8AC3E}">
-        <p14:creationId xmlns:p14="http://schemas.microsoft.com/office/powerpoint/2010/main" val="2144412366"/>
+        <p14:creationId xmlns:p14="http://schemas.microsoft.com/office/powerpoint/2010/main" val="3677784816"/>
       </p:ext>
     </p:extLst>
   </p:cSld>
@@ -5743,7 +5964,7 @@
     </p:spTree>
     <p:extLst>
       <p:ext uri="{BB962C8B-B14F-4D97-AF65-F5344CB8AC3E}">
-        <p14:creationId xmlns:p14="http://schemas.microsoft.com/office/powerpoint/2010/main" val="1199442764"/>
+        <p14:creationId xmlns:p14="http://schemas.microsoft.com/office/powerpoint/2010/main" val="3304741580"/>
       </p:ext>
     </p:extLst>
   </p:cSld>
@@ -5929,7 +6150,7 @@
     </p:spTree>
     <p:extLst>
       <p:ext uri="{BB962C8B-B14F-4D97-AF65-F5344CB8AC3E}">
-        <p14:creationId xmlns:p14="http://schemas.microsoft.com/office/powerpoint/2010/main" val="2210795121"/>
+        <p14:creationId xmlns:p14="http://schemas.microsoft.com/office/powerpoint/2010/main" val="413544642"/>
       </p:ext>
     </p:extLst>
   </p:cSld>
@@ -5973,67 +6194,28 @@
             <p:ph type="title"/>
           </p:nvPr>
         </p:nvSpPr>
-        <p:spPr>
-          <a:xfrm>
-            <a:off x="395536" y="116632"/>
-            <a:ext cx="8229600" cy="1143000"/>
-          </a:xfrm>
-        </p:spPr>
+        <p:spPr/>
         <p:txBody>
           <a:bodyPr/>
           <a:lstStyle/>
           <a:p>
             <a:r>
               <a:rPr lang="es-ES" dirty="0" smtClean="0"/>
-              <a:t>Montaje</a:t>
+              <a:t>Esquema hardware</a:t>
             </a:r>
             <a:endParaRPr lang="es-ES" dirty="0"/>
-          </a:p>
-        </p:txBody>
-      </p:sp>
-      <p:sp>
-        <p:nvSpPr>
-          <p:cNvPr id="3" name="2 Marcador de contenido"/>
-          <p:cNvSpPr>
-            <a:spLocks noGrp="1"/>
-          </p:cNvSpPr>
-          <p:nvPr>
-            <p:ph idx="1"/>
-          </p:nvPr>
-        </p:nvSpPr>
-        <p:spPr>
-          <a:xfrm>
-            <a:off x="395536" y="1340768"/>
-            <a:ext cx="8229600" cy="4709160"/>
-          </a:xfrm>
-        </p:spPr>
-        <p:txBody>
-          <a:bodyPr/>
-          <a:lstStyle/>
-          <a:p>
-            <a:r>
-              <a:rPr lang="es-ES" dirty="0" smtClean="0"/>
-              <a:t>Comprobación de funcionamiento </a:t>
-            </a:r>
-          </a:p>
-          <a:p>
-            <a:pPr marL="137160" indent="0">
-              <a:buNone/>
-            </a:pPr>
-            <a:r>
-              <a:rPr lang="es-ES" dirty="0" smtClean="0"/>
-              <a:t>de la pantalla.</a:t>
-            </a:r>
           </a:p>
         </p:txBody>
       </p:sp>
       <p:pic>
         <p:nvPicPr>
-          <p:cNvPr id="4" name="3 Imagen"/>
+          <p:cNvPr id="5" name="4 Marcador de contenido"/>
           <p:cNvPicPr>
-            <a:picLocks noChangeAspect="1"/>
+            <a:picLocks noGrp="1" noChangeAspect="1"/>
           </p:cNvPicPr>
-          <p:nvPr/>
+          <p:nvPr>
+            <p:ph idx="1"/>
+          </p:nvPr>
         </p:nvPicPr>
         <p:blipFill>
           <a:blip r:embed="rId2" cstate="print">
@@ -6049,78 +6231,15 @@
         </p:blipFill>
         <p:spPr>
           <a:xfrm>
-            <a:off x="6901668" y="0"/>
-            <a:ext cx="2221047" cy="3429000"/>
+            <a:off x="1187625" y="1600200"/>
+            <a:ext cx="6360114" cy="4708525"/>
           </a:xfrm>
-          <a:prstGeom prst="rect">
-            <a:avLst/>
-          </a:prstGeom>
-        </p:spPr>
-      </p:pic>
-      <p:pic>
-        <p:nvPicPr>
-          <p:cNvPr id="5" name="4 Imagen"/>
-          <p:cNvPicPr>
-            <a:picLocks noChangeAspect="1"/>
-          </p:cNvPicPr>
-          <p:nvPr/>
-        </p:nvPicPr>
-        <p:blipFill>
-          <a:blip r:embed="rId3" cstate="print">
-            <a:extLst>
-              <a:ext uri="{28A0092B-C50C-407E-A947-70E740481C1C}">
-                <a14:useLocalDpi xmlns:a14="http://schemas.microsoft.com/office/drawing/2010/main" val="0"/>
-              </a:ext>
-            </a:extLst>
-          </a:blip>
-          <a:stretch>
-            <a:fillRect/>
-          </a:stretch>
-        </p:blipFill>
-        <p:spPr>
-          <a:xfrm>
-            <a:off x="9275" y="2276872"/>
-            <a:ext cx="4829231" cy="2722361"/>
-          </a:xfrm>
-          <a:prstGeom prst="rect">
-            <a:avLst/>
-          </a:prstGeom>
-        </p:spPr>
-      </p:pic>
-      <p:pic>
-        <p:nvPicPr>
-          <p:cNvPr id="6" name="5 Imagen"/>
-          <p:cNvPicPr>
-            <a:picLocks noChangeAspect="1"/>
-          </p:cNvPicPr>
-          <p:nvPr/>
-        </p:nvPicPr>
-        <p:blipFill>
-          <a:blip r:embed="rId4" cstate="print">
-            <a:extLst>
-              <a:ext uri="{28A0092B-C50C-407E-A947-70E740481C1C}">
-                <a14:useLocalDpi xmlns:a14="http://schemas.microsoft.com/office/drawing/2010/main" val="0"/>
-              </a:ext>
-            </a:extLst>
-          </a:blip>
-          <a:stretch>
-            <a:fillRect/>
-          </a:stretch>
-        </p:blipFill>
-        <p:spPr>
-          <a:xfrm>
-            <a:off x="4205819" y="4077072"/>
-            <a:ext cx="4904886" cy="2767817"/>
-          </a:xfrm>
-          <a:prstGeom prst="rect">
-            <a:avLst/>
-          </a:prstGeom>
         </p:spPr>
       </p:pic>
     </p:spTree>
     <p:extLst>
       <p:ext uri="{BB962C8B-B14F-4D97-AF65-F5344CB8AC3E}">
-        <p14:creationId xmlns:p14="http://schemas.microsoft.com/office/powerpoint/2010/main" val="1497529568"/>
+        <p14:creationId xmlns:p14="http://schemas.microsoft.com/office/powerpoint/2010/main" val="3017095161"/>
       </p:ext>
     </p:extLst>
   </p:cSld>
@@ -6164,7 +6283,12 @@
             <p:ph type="title"/>
           </p:nvPr>
         </p:nvSpPr>
-        <p:spPr/>
+        <p:spPr>
+          <a:xfrm>
+            <a:off x="395536" y="116632"/>
+            <a:ext cx="8229600" cy="1143000"/>
+          </a:xfrm>
+        </p:spPr>
         <p:txBody>
           <a:bodyPr/>
           <a:lstStyle/>
@@ -6187,55 +6311,32 @@
             <p:ph idx="1"/>
           </p:nvPr>
         </p:nvSpPr>
-        <p:spPr/>
+        <p:spPr>
+          <a:xfrm>
+            <a:off x="395536" y="1340768"/>
+            <a:ext cx="8229600" cy="4709160"/>
+          </a:xfrm>
+        </p:spPr>
         <p:txBody>
           <a:bodyPr/>
           <a:lstStyle/>
           <a:p>
-            <a:r>
-              <a:rPr lang="es-ES" dirty="0" smtClean="0"/>
-              <a:t>Soldar la FONA a </a:t>
-            </a:r>
-          </a:p>
-          <a:p>
-            <a:pPr marL="137160" indent="0">
+            <a:pPr marL="137160" indent="0" algn="ctr">
               <a:buNone/>
             </a:pPr>
             <a:r>
               <a:rPr lang="es-ES" dirty="0" smtClean="0"/>
-              <a:t>la placa de </a:t>
-            </a:r>
-            <a:r>
-              <a:rPr lang="es-ES" dirty="0" err="1" smtClean="0"/>
-              <a:t>arduino</a:t>
-            </a:r>
-            <a:r>
-              <a:rPr lang="es-ES" dirty="0" smtClean="0"/>
-              <a:t> y</a:t>
-            </a:r>
-          </a:p>
-          <a:p>
-            <a:pPr marL="137160" indent="0">
+              <a:t>Comprobación de funcionamiento </a:t>
+            </a:r>
+          </a:p>
+          <a:p>
+            <a:pPr marL="137160" indent="0" algn="ctr">
               <a:buNone/>
             </a:pPr>
             <a:r>
-              <a:rPr lang="es-ES" dirty="0"/>
-              <a:t>a</a:t>
-            </a:r>
-            <a:r>
               <a:rPr lang="es-ES" dirty="0" smtClean="0"/>
-              <a:t> la pantalla y los </a:t>
-            </a:r>
-          </a:p>
-          <a:p>
-            <a:pPr marL="137160" indent="0">
-              <a:buNone/>
-            </a:pPr>
-            <a:r>
-              <a:rPr lang="es-ES" dirty="0" smtClean="0"/>
-              <a:t>componentes.</a:t>
-            </a:r>
-            <a:endParaRPr lang="es-ES" dirty="0"/>
+              <a:t>de la pantalla.</a:t>
+            </a:r>
           </a:p>
         </p:txBody>
       </p:sp>
@@ -6261,8 +6362,8 @@
         </p:blipFill>
         <p:spPr>
           <a:xfrm>
-            <a:off x="4427983" y="4197282"/>
-            <a:ext cx="4719883" cy="2660718"/>
+            <a:off x="3491880" y="3154660"/>
+            <a:ext cx="1847916" cy="2852936"/>
           </a:xfrm>
           <a:prstGeom prst="rect">
             <a:avLst/>
@@ -6291,8 +6392,8 @@
         </p:blipFill>
         <p:spPr>
           <a:xfrm>
-            <a:off x="4251399" y="1361734"/>
-            <a:ext cx="4889866" cy="2756542"/>
+            <a:off x="22934" y="3410009"/>
+            <a:ext cx="3277585" cy="1847659"/>
           </a:xfrm>
           <a:prstGeom prst="rect">
             <a:avLst/>
@@ -6321,8 +6422,8 @@
         </p:blipFill>
         <p:spPr>
           <a:xfrm>
-            <a:off x="-28693" y="4436020"/>
-            <a:ext cx="4024629" cy="2268786"/>
+            <a:off x="5486917" y="3301996"/>
+            <a:ext cx="3657081" cy="2063683"/>
           </a:xfrm>
           <a:prstGeom prst="rect">
             <a:avLst/>
@@ -6332,7 +6433,7 @@
     </p:spTree>
     <p:extLst>
       <p:ext uri="{BB962C8B-B14F-4D97-AF65-F5344CB8AC3E}">
-        <p14:creationId xmlns:p14="http://schemas.microsoft.com/office/powerpoint/2010/main" val="3802039511"/>
+        <p14:creationId xmlns:p14="http://schemas.microsoft.com/office/powerpoint/2010/main" val="1497529568"/>
       </p:ext>
     </p:extLst>
   </p:cSld>
@@ -6383,21 +6484,83 @@
           <a:p>
             <a:r>
               <a:rPr lang="es-ES" dirty="0" smtClean="0"/>
-              <a:t>Pruebas con la FONA</a:t>
+              <a:t>Montaje</a:t>
             </a:r>
             <a:endParaRPr lang="es-ES" dirty="0"/>
+          </a:p>
+        </p:txBody>
+      </p:sp>
+      <p:sp>
+        <p:nvSpPr>
+          <p:cNvPr id="3" name="2 Marcador de contenido"/>
+          <p:cNvSpPr>
+            <a:spLocks noGrp="1"/>
+          </p:cNvSpPr>
+          <p:nvPr>
+            <p:ph idx="1"/>
+          </p:nvPr>
+        </p:nvSpPr>
+        <p:spPr/>
+        <p:txBody>
+          <a:bodyPr/>
+          <a:lstStyle/>
+          <a:p>
+            <a:pPr marL="137160" indent="0">
+              <a:buNone/>
+            </a:pPr>
+            <a:r>
+              <a:rPr lang="es-ES" dirty="0" smtClean="0"/>
+              <a:t>Soldar la FONA a </a:t>
+            </a:r>
+          </a:p>
+          <a:p>
+            <a:pPr marL="137160" indent="0">
+              <a:buNone/>
+            </a:pPr>
+            <a:r>
+              <a:rPr lang="es-ES" dirty="0" smtClean="0"/>
+              <a:t>la placa de </a:t>
+            </a:r>
+            <a:r>
+              <a:rPr lang="es-ES" dirty="0" err="1" smtClean="0"/>
+              <a:t>Arduino</a:t>
+            </a:r>
+            <a:r>
+              <a:rPr lang="es-ES" dirty="0" smtClean="0"/>
+              <a:t>, y</a:t>
+            </a:r>
+          </a:p>
+          <a:p>
+            <a:pPr marL="137160" indent="0">
+              <a:buNone/>
+            </a:pPr>
+            <a:r>
+              <a:rPr lang="es-ES" dirty="0"/>
+              <a:t>s</a:t>
+            </a:r>
+            <a:r>
+              <a:rPr lang="es-ES" dirty="0" smtClean="0"/>
+              <a:t>oldar la pantalla encima</a:t>
+            </a:r>
+          </a:p>
+          <a:p>
+            <a:pPr marL="137160" indent="0">
+              <a:buNone/>
+            </a:pPr>
+            <a:r>
+              <a:rPr lang="es-ES" dirty="0" smtClean="0"/>
+              <a:t>de ambos.</a:t>
+            </a:r>
           </a:p>
         </p:txBody>
       </p:sp>
       <p:pic>
         <p:nvPicPr>
-          <p:cNvPr id="4" name="3 Marcador de contenido"/>
+          <p:cNvPr id="4" name="3 Imagen"/>
           <p:cNvPicPr>
-            <a:picLocks noGrp="1" noChangeAspect="1"/>
+            <a:picLocks noChangeAspect="1"/>
           </p:cNvPicPr>
-          <p:nvPr>
-            <p:ph idx="1"/>
-          </p:nvPr>
+          <p:nvPr/>
         </p:nvPicPr>
         <p:blipFill>
           <a:blip r:embed="rId2" cstate="print">
@@ -6413,9 +6576,12 @@
         </p:blipFill>
         <p:spPr>
           <a:xfrm>
-            <a:off x="755576" y="1196752"/>
-            <a:ext cx="3168352" cy="5620382"/>
+            <a:off x="4646743" y="4221088"/>
+            <a:ext cx="4137215" cy="2332253"/>
           </a:xfrm>
+          <a:prstGeom prst="rect">
+            <a:avLst/>
+          </a:prstGeom>
         </p:spPr>
       </p:pic>
       <p:pic>
@@ -6440,8 +6606,38 @@
         </p:blipFill>
         <p:spPr>
           <a:xfrm>
-            <a:off x="4788024" y="1196752"/>
-            <a:ext cx="3191389" cy="5661248"/>
+            <a:off x="4646744" y="1560771"/>
+            <a:ext cx="4208228" cy="2372285"/>
+          </a:xfrm>
+          <a:prstGeom prst="rect">
+            <a:avLst/>
+          </a:prstGeom>
+        </p:spPr>
+      </p:pic>
+      <p:pic>
+        <p:nvPicPr>
+          <p:cNvPr id="6" name="5 Imagen"/>
+          <p:cNvPicPr>
+            <a:picLocks noChangeAspect="1"/>
+          </p:cNvPicPr>
+          <p:nvPr/>
+        </p:nvPicPr>
+        <p:blipFill>
+          <a:blip r:embed="rId4" cstate="print">
+            <a:extLst>
+              <a:ext uri="{28A0092B-C50C-407E-A947-70E740481C1C}">
+                <a14:useLocalDpi xmlns:a14="http://schemas.microsoft.com/office/drawing/2010/main" val="0"/>
+              </a:ext>
+            </a:extLst>
+          </a:blip>
+          <a:stretch>
+            <a:fillRect/>
+          </a:stretch>
+        </p:blipFill>
+        <p:spPr>
+          <a:xfrm>
+            <a:off x="179512" y="4221088"/>
+            <a:ext cx="4024629" cy="2268786"/>
           </a:xfrm>
           <a:prstGeom prst="rect">
             <a:avLst/>
@@ -6451,7 +6647,7 @@
     </p:spTree>
     <p:extLst>
       <p:ext uri="{BB962C8B-B14F-4D97-AF65-F5344CB8AC3E}">
-        <p14:creationId xmlns:p14="http://schemas.microsoft.com/office/powerpoint/2010/main" val="537628809"/>
+        <p14:creationId xmlns:p14="http://schemas.microsoft.com/office/powerpoint/2010/main" val="3802039511"/>
       </p:ext>
     </p:extLst>
   </p:cSld>

</xml_diff>